<commit_message>
Applied comments on text and compressed
</commit_message>
<xml_diff>
--- a/papers/Case2016/pictures/pdf/CoverPhoto.pptx
+++ b/papers/Case2016/pictures/pdf/CoverPhoto.pptx
@@ -288,7 +288,7 @@
           <a:p>
             <a:fld id="{11760CE0-2B69-B54B-8FC7-76920B86A41F}" type="datetimeFigureOut">
               <a:rPr lang="en-US" smtClean="0"/>
-              <a:t>3/12/16</a:t>
+              <a:t>3/22/16</a:t>
             </a:fld>
             <a:endParaRPr lang="en-US"/>
           </a:p>
@@ -458,7 +458,7 @@
           <a:p>
             <a:fld id="{11760CE0-2B69-B54B-8FC7-76920B86A41F}" type="datetimeFigureOut">
               <a:rPr lang="en-US" smtClean="0"/>
-              <a:t>3/12/16</a:t>
+              <a:t>3/22/16</a:t>
             </a:fld>
             <a:endParaRPr lang="en-US"/>
           </a:p>
@@ -638,7 +638,7 @@
           <a:p>
             <a:fld id="{11760CE0-2B69-B54B-8FC7-76920B86A41F}" type="datetimeFigureOut">
               <a:rPr lang="en-US" smtClean="0"/>
-              <a:t>3/12/16</a:t>
+              <a:t>3/22/16</a:t>
             </a:fld>
             <a:endParaRPr lang="en-US"/>
           </a:p>
@@ -808,7 +808,7 @@
           <a:p>
             <a:fld id="{11760CE0-2B69-B54B-8FC7-76920B86A41F}" type="datetimeFigureOut">
               <a:rPr lang="en-US" smtClean="0"/>
-              <a:t>3/12/16</a:t>
+              <a:t>3/22/16</a:t>
             </a:fld>
             <a:endParaRPr lang="en-US"/>
           </a:p>
@@ -1054,7 +1054,7 @@
           <a:p>
             <a:fld id="{11760CE0-2B69-B54B-8FC7-76920B86A41F}" type="datetimeFigureOut">
               <a:rPr lang="en-US" smtClean="0"/>
-              <a:t>3/12/16</a:t>
+              <a:t>3/22/16</a:t>
             </a:fld>
             <a:endParaRPr lang="en-US"/>
           </a:p>
@@ -1342,7 +1342,7 @@
           <a:p>
             <a:fld id="{11760CE0-2B69-B54B-8FC7-76920B86A41F}" type="datetimeFigureOut">
               <a:rPr lang="en-US" smtClean="0"/>
-              <a:t>3/12/16</a:t>
+              <a:t>3/22/16</a:t>
             </a:fld>
             <a:endParaRPr lang="en-US"/>
           </a:p>
@@ -1769,7 +1769,7 @@
           <a:p>
             <a:fld id="{11760CE0-2B69-B54B-8FC7-76920B86A41F}" type="datetimeFigureOut">
               <a:rPr lang="en-US" smtClean="0"/>
-              <a:t>3/12/16</a:t>
+              <a:t>3/22/16</a:t>
             </a:fld>
             <a:endParaRPr lang="en-US"/>
           </a:p>
@@ -1887,7 +1887,7 @@
           <a:p>
             <a:fld id="{11760CE0-2B69-B54B-8FC7-76920B86A41F}" type="datetimeFigureOut">
               <a:rPr lang="en-US" smtClean="0"/>
-              <a:t>3/12/16</a:t>
+              <a:t>3/22/16</a:t>
             </a:fld>
             <a:endParaRPr lang="en-US"/>
           </a:p>
@@ -1982,7 +1982,7 @@
           <a:p>
             <a:fld id="{11760CE0-2B69-B54B-8FC7-76920B86A41F}" type="datetimeFigureOut">
               <a:rPr lang="en-US" smtClean="0"/>
-              <a:t>3/12/16</a:t>
+              <a:t>3/22/16</a:t>
             </a:fld>
             <a:endParaRPr lang="en-US"/>
           </a:p>
@@ -2259,7 +2259,7 @@
           <a:p>
             <a:fld id="{11760CE0-2B69-B54B-8FC7-76920B86A41F}" type="datetimeFigureOut">
               <a:rPr lang="en-US" smtClean="0"/>
-              <a:t>3/12/16</a:t>
+              <a:t>3/22/16</a:t>
             </a:fld>
             <a:endParaRPr lang="en-US"/>
           </a:p>
@@ -2512,7 +2512,7 @@
           <a:p>
             <a:fld id="{11760CE0-2B69-B54B-8FC7-76920B86A41F}" type="datetimeFigureOut">
               <a:rPr lang="en-US" smtClean="0"/>
-              <a:t>3/12/16</a:t>
+              <a:t>3/22/16</a:t>
             </a:fld>
             <a:endParaRPr lang="en-US"/>
           </a:p>
@@ -2725,7 +2725,7 @@
           <a:p>
             <a:fld id="{11760CE0-2B69-B54B-8FC7-76920B86A41F}" type="datetimeFigureOut">
               <a:rPr lang="en-US" smtClean="0"/>
-              <a:t>3/12/16</a:t>
+              <a:t>3/22/16</a:t>
             </a:fld>
             <a:endParaRPr lang="en-US"/>
           </a:p>
@@ -3109,10 +3109,10 @@
           <p:nvPr/>
         </p:nvPicPr>
         <p:blipFill>
-          <a:blip r:embed="rId2">
+          <a:blip r:embed="rId2" cstate="screen">
             <a:extLst>
               <a:ext uri="{28A0092B-C50C-407E-A947-70E740481C1C}">
-                <a14:useLocalDpi xmlns:a14="http://schemas.microsoft.com/office/drawing/2010/main" val="0"/>
+                <a14:useLocalDpi xmlns:a14="http://schemas.microsoft.com/office/drawing/2010/main"/>
               </a:ext>
             </a:extLst>
           </a:blip>
@@ -3229,15 +3229,7 @@
                   <a:schemeClr val="tx1"/>
                 </a:solidFill>
               </a:rPr>
-              <a:t>Detected </a:t>
-            </a:r>
-            <a:r>
-              <a:rPr lang="en-US" sz="1600" dirty="0" smtClean="0">
-                <a:solidFill>
-                  <a:schemeClr val="tx1"/>
-                </a:solidFill>
-              </a:rPr>
-              <a:t>Robots</a:t>
+              <a:t>Detected Robots</a:t>
             </a:r>
           </a:p>
           <a:p>
@@ -3332,10 +3324,10 @@
           <p:nvPr/>
         </p:nvPicPr>
         <p:blipFill>
-          <a:blip r:embed="rId3">
+          <a:blip r:embed="rId3" cstate="screen">
             <a:extLst>
               <a:ext uri="{28A0092B-C50C-407E-A947-70E740481C1C}">
-                <a14:useLocalDpi xmlns:a14="http://schemas.microsoft.com/office/drawing/2010/main" val="0"/>
+                <a14:useLocalDpi xmlns:a14="http://schemas.microsoft.com/office/drawing/2010/main"/>
               </a:ext>
             </a:extLst>
           </a:blip>
@@ -3545,10 +3537,10 @@
           <p:nvPr/>
         </p:nvPicPr>
         <p:blipFill>
-          <a:blip r:embed="rId4">
+          <a:blip r:embed="rId4" cstate="screen">
             <a:extLst>
               <a:ext uri="{28A0092B-C50C-407E-A947-70E740481C1C}">
-                <a14:useLocalDpi xmlns:a14="http://schemas.microsoft.com/office/drawing/2010/main" val="0"/>
+                <a14:useLocalDpi xmlns:a14="http://schemas.microsoft.com/office/drawing/2010/main"/>
               </a:ext>
             </a:extLst>
           </a:blip>
@@ -3575,10 +3567,10 @@
           <p:nvPr/>
         </p:nvPicPr>
         <p:blipFill>
-          <a:blip r:embed="rId5">
+          <a:blip r:embed="rId5" cstate="screen">
             <a:extLst>
               <a:ext uri="{28A0092B-C50C-407E-A947-70E740481C1C}">
-                <a14:useLocalDpi xmlns:a14="http://schemas.microsoft.com/office/drawing/2010/main" val="0"/>
+                <a14:useLocalDpi xmlns:a14="http://schemas.microsoft.com/office/drawing/2010/main"/>
               </a:ext>
             </a:extLst>
           </a:blip>

</xml_diff>

<commit_message>
Updated all the figures with the new settings
</commit_message>
<xml_diff>
--- a/papers/Case2016/pictures/pdf/CoverPhoto.pptx
+++ b/papers/Case2016/pictures/pdf/CoverPhoto.pptx
@@ -288,7 +288,7 @@
           <a:p>
             <a:fld id="{11760CE0-2B69-B54B-8FC7-76920B86A41F}" type="datetimeFigureOut">
               <a:rPr lang="en-US" smtClean="0"/>
-              <a:t>3/22/16</a:t>
+              <a:t>3/27/16</a:t>
             </a:fld>
             <a:endParaRPr lang="en-US"/>
           </a:p>
@@ -458,7 +458,7 @@
           <a:p>
             <a:fld id="{11760CE0-2B69-B54B-8FC7-76920B86A41F}" type="datetimeFigureOut">
               <a:rPr lang="en-US" smtClean="0"/>
-              <a:t>3/22/16</a:t>
+              <a:t>3/27/16</a:t>
             </a:fld>
             <a:endParaRPr lang="en-US"/>
           </a:p>
@@ -638,7 +638,7 @@
           <a:p>
             <a:fld id="{11760CE0-2B69-B54B-8FC7-76920B86A41F}" type="datetimeFigureOut">
               <a:rPr lang="en-US" smtClean="0"/>
-              <a:t>3/22/16</a:t>
+              <a:t>3/27/16</a:t>
             </a:fld>
             <a:endParaRPr lang="en-US"/>
           </a:p>
@@ -808,7 +808,7 @@
           <a:p>
             <a:fld id="{11760CE0-2B69-B54B-8FC7-76920B86A41F}" type="datetimeFigureOut">
               <a:rPr lang="en-US" smtClean="0"/>
-              <a:t>3/22/16</a:t>
+              <a:t>3/27/16</a:t>
             </a:fld>
             <a:endParaRPr lang="en-US"/>
           </a:p>
@@ -1054,7 +1054,7 @@
           <a:p>
             <a:fld id="{11760CE0-2B69-B54B-8FC7-76920B86A41F}" type="datetimeFigureOut">
               <a:rPr lang="en-US" smtClean="0"/>
-              <a:t>3/22/16</a:t>
+              <a:t>3/27/16</a:t>
             </a:fld>
             <a:endParaRPr lang="en-US"/>
           </a:p>
@@ -1342,7 +1342,7 @@
           <a:p>
             <a:fld id="{11760CE0-2B69-B54B-8FC7-76920B86A41F}" type="datetimeFigureOut">
               <a:rPr lang="en-US" smtClean="0"/>
-              <a:t>3/22/16</a:t>
+              <a:t>3/27/16</a:t>
             </a:fld>
             <a:endParaRPr lang="en-US"/>
           </a:p>
@@ -1769,7 +1769,7 @@
           <a:p>
             <a:fld id="{11760CE0-2B69-B54B-8FC7-76920B86A41F}" type="datetimeFigureOut">
               <a:rPr lang="en-US" smtClean="0"/>
-              <a:t>3/22/16</a:t>
+              <a:t>3/27/16</a:t>
             </a:fld>
             <a:endParaRPr lang="en-US"/>
           </a:p>
@@ -1887,7 +1887,7 @@
           <a:p>
             <a:fld id="{11760CE0-2B69-B54B-8FC7-76920B86A41F}" type="datetimeFigureOut">
               <a:rPr lang="en-US" smtClean="0"/>
-              <a:t>3/22/16</a:t>
+              <a:t>3/27/16</a:t>
             </a:fld>
             <a:endParaRPr lang="en-US"/>
           </a:p>
@@ -1982,7 +1982,7 @@
           <a:p>
             <a:fld id="{11760CE0-2B69-B54B-8FC7-76920B86A41F}" type="datetimeFigureOut">
               <a:rPr lang="en-US" smtClean="0"/>
-              <a:t>3/22/16</a:t>
+              <a:t>3/27/16</a:t>
             </a:fld>
             <a:endParaRPr lang="en-US"/>
           </a:p>
@@ -2259,7 +2259,7 @@
           <a:p>
             <a:fld id="{11760CE0-2B69-B54B-8FC7-76920B86A41F}" type="datetimeFigureOut">
               <a:rPr lang="en-US" smtClean="0"/>
-              <a:t>3/22/16</a:t>
+              <a:t>3/27/16</a:t>
             </a:fld>
             <a:endParaRPr lang="en-US"/>
           </a:p>
@@ -2512,7 +2512,7 @@
           <a:p>
             <a:fld id="{11760CE0-2B69-B54B-8FC7-76920B86A41F}" type="datetimeFigureOut">
               <a:rPr lang="en-US" smtClean="0"/>
-              <a:t>3/22/16</a:t>
+              <a:t>3/27/16</a:t>
             </a:fld>
             <a:endParaRPr lang="en-US"/>
           </a:p>
@@ -2725,7 +2725,7 @@
           <a:p>
             <a:fld id="{11760CE0-2B69-B54B-8FC7-76920B86A41F}" type="datetimeFigureOut">
               <a:rPr lang="en-US" smtClean="0"/>
-              <a:t>3/22/16</a:t>
+              <a:t>3/27/16</a:t>
             </a:fld>
             <a:endParaRPr lang="en-US"/>
           </a:p>
@@ -3102,17 +3102,17 @@
       </p:grpSpPr>
       <p:pic>
         <p:nvPicPr>
-          <p:cNvPr id="93" name="Picture 92" descr="Cover3.png"/>
+          <p:cNvPr id="3" name="Picture 2" descr="Orient3.png"/>
           <p:cNvPicPr>
             <a:picLocks noChangeAspect="1"/>
           </p:cNvPicPr>
           <p:nvPr/>
         </p:nvPicPr>
         <p:blipFill>
-          <a:blip r:embed="rId2" cstate="screen">
+          <a:blip r:embed="rId2">
             <a:extLst>
               <a:ext uri="{28A0092B-C50C-407E-A947-70E740481C1C}">
-                <a14:useLocalDpi xmlns:a14="http://schemas.microsoft.com/office/drawing/2010/main"/>
+                <a14:useLocalDpi xmlns:a14="http://schemas.microsoft.com/office/drawing/2010/main" val="0"/>
               </a:ext>
             </a:extLst>
           </a:blip>
@@ -3122,202 +3122,17 @@
         </p:blipFill>
         <p:spPr>
           <a:xfrm>
-            <a:off x="83368" y="2690189"/>
-            <a:ext cx="5403032" cy="4091690"/>
+            <a:off x="2120793" y="105489"/>
+            <a:ext cx="4319036" cy="2430059"/>
           </a:xfrm>
           <a:prstGeom prst="rect">
             <a:avLst/>
           </a:prstGeom>
         </p:spPr>
       </p:pic>
-      <p:sp>
-        <p:nvSpPr>
-          <p:cNvPr id="94" name="Rectangle 93"/>
-          <p:cNvSpPr/>
-          <p:nvPr/>
-        </p:nvSpPr>
-        <p:spPr>
-          <a:xfrm>
-            <a:off x="2618568" y="3652853"/>
-            <a:ext cx="155458" cy="3217674"/>
-          </a:xfrm>
-          <a:prstGeom prst="rect">
-            <a:avLst/>
-          </a:prstGeom>
-          <a:noFill/>
-          <a:ln w="25400">
-            <a:solidFill>
-              <a:srgbClr val="008000"/>
-            </a:solidFill>
-            <a:prstDash val="sysDash"/>
-          </a:ln>
-        </p:spPr>
-        <p:style>
-          <a:lnRef idx="1">
-            <a:schemeClr val="accent1"/>
-          </a:lnRef>
-          <a:fillRef idx="3">
-            <a:schemeClr val="accent1"/>
-          </a:fillRef>
-          <a:effectRef idx="2">
-            <a:schemeClr val="accent1"/>
-          </a:effectRef>
-          <a:fontRef idx="minor">
-            <a:schemeClr val="lt1"/>
-          </a:fontRef>
-        </p:style>
-        <p:txBody>
-          <a:bodyPr rtlCol="0" anchor="ctr"/>
-          <a:lstStyle/>
-          <a:p>
-            <a:pPr algn="ctr"/>
-            <a:endParaRPr lang="en-US"/>
-          </a:p>
-        </p:txBody>
-      </p:sp>
-      <p:sp>
-        <p:nvSpPr>
-          <p:cNvPr id="95" name="Rectangle 94"/>
-          <p:cNvSpPr/>
-          <p:nvPr/>
-        </p:nvSpPr>
-        <p:spPr>
-          <a:xfrm>
-            <a:off x="325412" y="4941456"/>
-            <a:ext cx="2063162" cy="1687484"/>
-          </a:xfrm>
-          <a:prstGeom prst="rect">
-            <a:avLst/>
-          </a:prstGeom>
-          <a:noFill/>
-          <a:ln>
-            <a:solidFill>
-              <a:schemeClr val="accent6">
-                <a:lumMod val="50000"/>
-              </a:schemeClr>
-            </a:solidFill>
-          </a:ln>
-        </p:spPr>
-        <p:style>
-          <a:lnRef idx="1">
-            <a:schemeClr val="accent1"/>
-          </a:lnRef>
-          <a:fillRef idx="3">
-            <a:schemeClr val="accent1"/>
-          </a:fillRef>
-          <a:effectRef idx="2">
-            <a:schemeClr val="accent1"/>
-          </a:effectRef>
-          <a:fontRef idx="minor">
-            <a:schemeClr val="lt1"/>
-          </a:fontRef>
-        </p:style>
-        <p:txBody>
-          <a:bodyPr rtlCol="0" anchor="ctr"/>
-          <a:lstStyle/>
-          <a:p>
-            <a:endParaRPr lang="en-US" sz="2400" dirty="0" smtClean="0">
-              <a:solidFill>
-                <a:schemeClr val="tx1"/>
-              </a:solidFill>
-            </a:endParaRPr>
-          </a:p>
-          <a:p>
-            <a:r>
-              <a:rPr lang="en-US" sz="1600" dirty="0" smtClean="0">
-                <a:solidFill>
-                  <a:schemeClr val="tx1"/>
-                </a:solidFill>
-              </a:rPr>
-              <a:t>Detected Robots</a:t>
-            </a:r>
-          </a:p>
-          <a:p>
-            <a:r>
-              <a:rPr lang="en-US" sz="1600" dirty="0" smtClean="0">
-                <a:solidFill>
-                  <a:schemeClr val="tx1"/>
-                </a:solidFill>
-              </a:rPr>
-              <a:t>Mean Position           </a:t>
-            </a:r>
-            <a:r>
-              <a:rPr lang="en-US" sz="1600" dirty="0" smtClean="0">
-                <a:solidFill>
-                  <a:srgbClr val="FF0000"/>
-                </a:solidFill>
-                <a:latin typeface="ＭＳ ゴシック"/>
-                <a:ea typeface="ＭＳ ゴシック"/>
-                <a:cs typeface="ＭＳ ゴシック"/>
-              </a:rPr>
-              <a:t>+</a:t>
-            </a:r>
-            <a:endParaRPr lang="en-US" sz="1600" dirty="0" smtClean="0">
-              <a:solidFill>
-                <a:srgbClr val="FF0000"/>
-              </a:solidFill>
-            </a:endParaRPr>
-          </a:p>
-          <a:p>
-            <a:r>
-              <a:rPr lang="en-US" sz="1600" dirty="0" smtClean="0">
-                <a:solidFill>
-                  <a:schemeClr val="tx1"/>
-                </a:solidFill>
-              </a:rPr>
-              <a:t>Covariance Ellipse</a:t>
-            </a:r>
-          </a:p>
-          <a:p>
-            <a:r>
-              <a:rPr lang="en-US" sz="1600" dirty="0" smtClean="0">
-                <a:solidFill>
-                  <a:schemeClr val="tx1"/>
-                </a:solidFill>
-              </a:rPr>
-              <a:t>Object</a:t>
-            </a:r>
-          </a:p>
-          <a:p>
-            <a:r>
-              <a:rPr lang="en-US" sz="1600" dirty="0" smtClean="0">
-                <a:solidFill>
-                  <a:schemeClr val="tx1"/>
-                </a:solidFill>
-              </a:rPr>
-              <a:t>Goal</a:t>
-            </a:r>
-          </a:p>
-          <a:p>
-            <a:r>
-              <a:rPr lang="en-US" sz="1600" dirty="0" smtClean="0">
-                <a:solidFill>
-                  <a:schemeClr val="tx1"/>
-                </a:solidFill>
-              </a:rPr>
-              <a:t>Pivot</a:t>
-            </a:r>
-            <a:endParaRPr lang="ar-IQ" sz="1600" dirty="0" smtClean="0">
-              <a:solidFill>
-                <a:schemeClr val="tx1"/>
-              </a:solidFill>
-            </a:endParaRPr>
-          </a:p>
-          <a:p>
-            <a:endParaRPr lang="en-US" sz="1600" dirty="0" smtClean="0">
-              <a:solidFill>
-                <a:schemeClr val="tx1"/>
-              </a:solidFill>
-            </a:endParaRPr>
-          </a:p>
-          <a:p>
-            <a:endParaRPr lang="en-US" sz="1600" dirty="0"/>
-          </a:p>
-        </p:txBody>
-      </p:sp>
       <p:pic>
         <p:nvPicPr>
-          <p:cNvPr id="96" name="Picture 95" descr="Robot.png"/>
+          <p:cNvPr id="93" name="Picture 92" descr="Cover3.png"/>
           <p:cNvPicPr>
             <a:picLocks noChangeAspect="1"/>
           </p:cNvPicPr>
@@ -3337,8 +3152,8 @@
         </p:blipFill>
         <p:spPr>
           <a:xfrm>
-            <a:off x="2063173" y="5064775"/>
-            <a:ext cx="156226" cy="176255"/>
+            <a:off x="83368" y="2690189"/>
+            <a:ext cx="5403032" cy="4091690"/>
           </a:xfrm>
           <a:prstGeom prst="rect">
             <a:avLst/>
@@ -3347,25 +3162,24 @@
       </p:pic>
       <p:sp>
         <p:nvSpPr>
-          <p:cNvPr id="97" name="Rectangle 96"/>
+          <p:cNvPr id="94" name="Rectangle 93"/>
           <p:cNvSpPr/>
           <p:nvPr/>
         </p:nvSpPr>
         <p:spPr>
           <a:xfrm>
-            <a:off x="1977217" y="5787911"/>
-            <a:ext cx="370706" cy="119593"/>
+            <a:off x="2618568" y="3652853"/>
+            <a:ext cx="155458" cy="3217674"/>
           </a:xfrm>
           <a:prstGeom prst="rect">
             <a:avLst/>
           </a:prstGeom>
-          <a:solidFill>
-            <a:srgbClr val="BB277E"/>
-          </a:solidFill>
-          <a:ln>
+          <a:noFill/>
+          <a:ln w="25400">
             <a:solidFill>
-              <a:srgbClr val="BB277E"/>
+              <a:srgbClr val="008000"/>
             </a:solidFill>
+            <a:prstDash val="sysDash"/>
           </a:ln>
         </p:spPr>
         <p:style>
@@ -3393,24 +3207,25 @@
       </p:sp>
       <p:sp>
         <p:nvSpPr>
-          <p:cNvPr id="99" name="Rectangle 98"/>
+          <p:cNvPr id="95" name="Rectangle 94"/>
           <p:cNvSpPr/>
           <p:nvPr/>
         </p:nvSpPr>
         <p:spPr>
           <a:xfrm>
-            <a:off x="45006" y="2738576"/>
-            <a:ext cx="5426938" cy="4062358"/>
+            <a:off x="325412" y="4941456"/>
+            <a:ext cx="2063162" cy="1687484"/>
           </a:xfrm>
           <a:prstGeom prst="rect">
             <a:avLst/>
           </a:prstGeom>
           <a:noFill/>
-          <a:ln w="152400" cmpd="sng">
+          <a:ln>
             <a:solidFill>
-              <a:srgbClr val="F9017A"/>
+              <a:schemeClr val="accent6">
+                <a:lumMod val="50000"/>
+              </a:schemeClr>
             </a:solidFill>
-            <a:miter lim="800000"/>
           </a:ln>
         </p:spPr>
         <p:style>
@@ -3431,106 +3246,108 @@
           <a:bodyPr rtlCol="0" anchor="ctr"/>
           <a:lstStyle/>
           <a:p>
-            <a:pPr algn="ctr"/>
-            <a:endParaRPr lang="en-US"/>
-          </a:p>
-        </p:txBody>
-      </p:sp>
-      <p:sp>
-        <p:nvSpPr>
-          <p:cNvPr id="100" name="Oval 99"/>
-          <p:cNvSpPr>
-            <a:spLocks noChangeAspect="1"/>
-          </p:cNvSpPr>
-          <p:nvPr/>
-        </p:nvSpPr>
-        <p:spPr>
-          <a:xfrm>
-            <a:off x="2644488" y="6751824"/>
-            <a:ext cx="91440" cy="91440"/>
-          </a:xfrm>
-          <a:prstGeom prst="ellipse">
-            <a:avLst/>
-          </a:prstGeom>
-          <a:solidFill>
-            <a:srgbClr val="FF0000"/>
-          </a:solidFill>
-          <a:ln>
-            <a:solidFill>
-              <a:schemeClr val="tx1"/>
-            </a:solidFill>
-          </a:ln>
-        </p:spPr>
-        <p:style>
-          <a:lnRef idx="1">
-            <a:schemeClr val="accent1"/>
-          </a:lnRef>
-          <a:fillRef idx="3">
-            <a:schemeClr val="accent1"/>
-          </a:fillRef>
-          <a:effectRef idx="2">
-            <a:schemeClr val="accent1"/>
-          </a:effectRef>
-          <a:fontRef idx="minor">
-            <a:schemeClr val="lt1"/>
-          </a:fontRef>
-        </p:style>
-        <p:txBody>
-          <a:bodyPr rtlCol="0" anchor="ctr"/>
-          <a:lstStyle/>
-          <a:p>
-            <a:pPr algn="ctr"/>
-            <a:endParaRPr lang="en-US"/>
-          </a:p>
-        </p:txBody>
-      </p:sp>
-      <p:sp>
-        <p:nvSpPr>
-          <p:cNvPr id="101" name="Oval 100"/>
-          <p:cNvSpPr/>
-          <p:nvPr/>
-        </p:nvSpPr>
-        <p:spPr>
-          <a:xfrm>
-            <a:off x="2001817" y="5566787"/>
-            <a:ext cx="341579" cy="108729"/>
-          </a:xfrm>
-          <a:prstGeom prst="ellipse">
-            <a:avLst/>
-          </a:prstGeom>
-          <a:noFill/>
-          <a:ln>
-            <a:solidFill>
-              <a:srgbClr val="FF0000"/>
-            </a:solidFill>
-          </a:ln>
-        </p:spPr>
-        <p:style>
-          <a:lnRef idx="1">
-            <a:schemeClr val="accent1"/>
-          </a:lnRef>
-          <a:fillRef idx="3">
-            <a:schemeClr val="accent1"/>
-          </a:fillRef>
-          <a:effectRef idx="2">
-            <a:schemeClr val="accent1"/>
-          </a:effectRef>
-          <a:fontRef idx="minor">
-            <a:schemeClr val="lt1"/>
-          </a:fontRef>
-        </p:style>
-        <p:txBody>
-          <a:bodyPr rtlCol="0" anchor="ctr"/>
-          <a:lstStyle/>
-          <a:p>
-            <a:pPr algn="ctr"/>
-            <a:endParaRPr lang="en-US"/>
+            <a:endParaRPr lang="en-US" sz="2400" dirty="0" smtClean="0">
+              <a:solidFill>
+                <a:schemeClr val="tx1"/>
+              </a:solidFill>
+            </a:endParaRPr>
+          </a:p>
+          <a:p>
+            <a:r>
+              <a:rPr lang="en-US" sz="1600" dirty="0" smtClean="0">
+                <a:solidFill>
+                  <a:schemeClr val="tx1"/>
+                </a:solidFill>
+              </a:rPr>
+              <a:t>Detected Robots</a:t>
+            </a:r>
+          </a:p>
+          <a:p>
+            <a:r>
+              <a:rPr lang="en-US" sz="1600" dirty="0" smtClean="0">
+                <a:solidFill>
+                  <a:schemeClr val="tx1"/>
+                </a:solidFill>
+              </a:rPr>
+              <a:t>Mean Position           </a:t>
+            </a:r>
+            <a:r>
+              <a:rPr lang="en-US" sz="1600" dirty="0" smtClean="0">
+                <a:solidFill>
+                  <a:srgbClr val="FF0000"/>
+                </a:solidFill>
+                <a:latin typeface="ＭＳ ゴシック"/>
+                <a:ea typeface="ＭＳ ゴシック"/>
+                <a:cs typeface="ＭＳ ゴシック"/>
+              </a:rPr>
+              <a:t>+</a:t>
+            </a:r>
+            <a:endParaRPr lang="en-US" sz="1600" dirty="0" smtClean="0">
+              <a:solidFill>
+                <a:srgbClr val="FF0000"/>
+              </a:solidFill>
+            </a:endParaRPr>
+          </a:p>
+          <a:p>
+            <a:r>
+              <a:rPr lang="en-US" sz="1600" dirty="0" smtClean="0">
+                <a:solidFill>
+                  <a:schemeClr val="tx1"/>
+                </a:solidFill>
+              </a:rPr>
+              <a:t>Covariance Ellipse</a:t>
+            </a:r>
+          </a:p>
+          <a:p>
+            <a:r>
+              <a:rPr lang="en-US" sz="1600" dirty="0" smtClean="0">
+                <a:solidFill>
+                  <a:schemeClr val="tx1"/>
+                </a:solidFill>
+              </a:rPr>
+              <a:t>Object</a:t>
+            </a:r>
+          </a:p>
+          <a:p>
+            <a:r>
+              <a:rPr lang="en-US" sz="1600" dirty="0" smtClean="0">
+                <a:solidFill>
+                  <a:schemeClr val="tx1"/>
+                </a:solidFill>
+              </a:rPr>
+              <a:t>Goal</a:t>
+            </a:r>
+          </a:p>
+          <a:p>
+            <a:r>
+              <a:rPr lang="en-US" sz="1600" dirty="0" smtClean="0">
+                <a:solidFill>
+                  <a:schemeClr val="tx1"/>
+                </a:solidFill>
+              </a:rPr>
+              <a:t>Pivot</a:t>
+            </a:r>
+            <a:endParaRPr lang="ar-IQ" sz="1600" dirty="0" smtClean="0">
+              <a:solidFill>
+                <a:schemeClr val="tx1"/>
+              </a:solidFill>
+            </a:endParaRPr>
+          </a:p>
+          <a:p>
+            <a:endParaRPr lang="en-US" sz="1600" dirty="0" smtClean="0">
+              <a:solidFill>
+                <a:schemeClr val="tx1"/>
+              </a:solidFill>
+            </a:endParaRPr>
+          </a:p>
+          <a:p>
+            <a:endParaRPr lang="en-US" sz="1600" dirty="0"/>
           </a:p>
         </p:txBody>
       </p:sp>
       <p:pic>
         <p:nvPicPr>
-          <p:cNvPr id="46" name="Picture 45" descr="Stright2.png"/>
+          <p:cNvPr id="96" name="Picture 95" descr="Robot.png"/>
           <p:cNvPicPr>
             <a:picLocks noChangeAspect="1"/>
           </p:cNvPicPr>
@@ -3550,17 +3367,200 @@
         </p:blipFill>
         <p:spPr>
           <a:xfrm>
-            <a:off x="-37289" y="105489"/>
-            <a:ext cx="1992462" cy="2465918"/>
+            <a:off x="2063173" y="5064775"/>
+            <a:ext cx="156226" cy="176255"/>
           </a:xfrm>
           <a:prstGeom prst="rect">
             <a:avLst/>
           </a:prstGeom>
         </p:spPr>
       </p:pic>
+      <p:sp>
+        <p:nvSpPr>
+          <p:cNvPr id="97" name="Rectangle 96"/>
+          <p:cNvSpPr/>
+          <p:nvPr/>
+        </p:nvSpPr>
+        <p:spPr>
+          <a:xfrm>
+            <a:off x="1977217" y="5787911"/>
+            <a:ext cx="370706" cy="119593"/>
+          </a:xfrm>
+          <a:prstGeom prst="rect">
+            <a:avLst/>
+          </a:prstGeom>
+          <a:solidFill>
+            <a:srgbClr val="BB277E"/>
+          </a:solidFill>
+          <a:ln>
+            <a:solidFill>
+              <a:srgbClr val="BB277E"/>
+            </a:solidFill>
+          </a:ln>
+        </p:spPr>
+        <p:style>
+          <a:lnRef idx="1">
+            <a:schemeClr val="accent1"/>
+          </a:lnRef>
+          <a:fillRef idx="3">
+            <a:schemeClr val="accent1"/>
+          </a:fillRef>
+          <a:effectRef idx="2">
+            <a:schemeClr val="accent1"/>
+          </a:effectRef>
+          <a:fontRef idx="minor">
+            <a:schemeClr val="lt1"/>
+          </a:fontRef>
+        </p:style>
+        <p:txBody>
+          <a:bodyPr rtlCol="0" anchor="ctr"/>
+          <a:lstStyle/>
+          <a:p>
+            <a:pPr algn="ctr"/>
+            <a:endParaRPr lang="en-US"/>
+          </a:p>
+        </p:txBody>
+      </p:sp>
+      <p:sp>
+        <p:nvSpPr>
+          <p:cNvPr id="99" name="Rectangle 98"/>
+          <p:cNvSpPr/>
+          <p:nvPr/>
+        </p:nvSpPr>
+        <p:spPr>
+          <a:xfrm>
+            <a:off x="45006" y="2738576"/>
+            <a:ext cx="5426938" cy="4062358"/>
+          </a:xfrm>
+          <a:prstGeom prst="rect">
+            <a:avLst/>
+          </a:prstGeom>
+          <a:noFill/>
+          <a:ln w="152400" cmpd="sng">
+            <a:solidFill>
+              <a:srgbClr val="F9017A"/>
+            </a:solidFill>
+            <a:miter lim="800000"/>
+          </a:ln>
+        </p:spPr>
+        <p:style>
+          <a:lnRef idx="1">
+            <a:schemeClr val="accent1"/>
+          </a:lnRef>
+          <a:fillRef idx="3">
+            <a:schemeClr val="accent1"/>
+          </a:fillRef>
+          <a:effectRef idx="2">
+            <a:schemeClr val="accent1"/>
+          </a:effectRef>
+          <a:fontRef idx="minor">
+            <a:schemeClr val="lt1"/>
+          </a:fontRef>
+        </p:style>
+        <p:txBody>
+          <a:bodyPr rtlCol="0" anchor="ctr"/>
+          <a:lstStyle/>
+          <a:p>
+            <a:pPr algn="ctr"/>
+            <a:endParaRPr lang="en-US"/>
+          </a:p>
+        </p:txBody>
+      </p:sp>
+      <p:sp>
+        <p:nvSpPr>
+          <p:cNvPr id="100" name="Oval 99"/>
+          <p:cNvSpPr>
+            <a:spLocks noChangeAspect="1"/>
+          </p:cNvSpPr>
+          <p:nvPr/>
+        </p:nvSpPr>
+        <p:spPr>
+          <a:xfrm>
+            <a:off x="2644488" y="6751824"/>
+            <a:ext cx="91440" cy="91440"/>
+          </a:xfrm>
+          <a:prstGeom prst="ellipse">
+            <a:avLst/>
+          </a:prstGeom>
+          <a:solidFill>
+            <a:srgbClr val="FF0000"/>
+          </a:solidFill>
+          <a:ln>
+            <a:solidFill>
+              <a:schemeClr val="tx1"/>
+            </a:solidFill>
+          </a:ln>
+        </p:spPr>
+        <p:style>
+          <a:lnRef idx="1">
+            <a:schemeClr val="accent1"/>
+          </a:lnRef>
+          <a:fillRef idx="3">
+            <a:schemeClr val="accent1"/>
+          </a:fillRef>
+          <a:effectRef idx="2">
+            <a:schemeClr val="accent1"/>
+          </a:effectRef>
+          <a:fontRef idx="minor">
+            <a:schemeClr val="lt1"/>
+          </a:fontRef>
+        </p:style>
+        <p:txBody>
+          <a:bodyPr rtlCol="0" anchor="ctr"/>
+          <a:lstStyle/>
+          <a:p>
+            <a:pPr algn="ctr"/>
+            <a:endParaRPr lang="en-US"/>
+          </a:p>
+        </p:txBody>
+      </p:sp>
+      <p:sp>
+        <p:nvSpPr>
+          <p:cNvPr id="101" name="Oval 100"/>
+          <p:cNvSpPr/>
+          <p:nvPr/>
+        </p:nvSpPr>
+        <p:spPr>
+          <a:xfrm>
+            <a:off x="2001817" y="5566787"/>
+            <a:ext cx="341579" cy="108729"/>
+          </a:xfrm>
+          <a:prstGeom prst="ellipse">
+            <a:avLst/>
+          </a:prstGeom>
+          <a:noFill/>
+          <a:ln>
+            <a:solidFill>
+              <a:srgbClr val="FF0000"/>
+            </a:solidFill>
+          </a:ln>
+        </p:spPr>
+        <p:style>
+          <a:lnRef idx="1">
+            <a:schemeClr val="accent1"/>
+          </a:lnRef>
+          <a:fillRef idx="3">
+            <a:schemeClr val="accent1"/>
+          </a:fillRef>
+          <a:effectRef idx="2">
+            <a:schemeClr val="accent1"/>
+          </a:effectRef>
+          <a:fontRef idx="minor">
+            <a:schemeClr val="lt1"/>
+          </a:fontRef>
+        </p:style>
+        <p:txBody>
+          <a:bodyPr rtlCol="0" anchor="ctr"/>
+          <a:lstStyle/>
+          <a:p>
+            <a:pPr algn="ctr"/>
+            <a:endParaRPr lang="en-US"/>
+          </a:p>
+        </p:txBody>
+      </p:sp>
       <p:pic>
         <p:nvPicPr>
-          <p:cNvPr id="48" name="Picture 47" descr="Orient2.png"/>
+          <p:cNvPr id="46" name="Picture 45" descr="Stright2.png"/>
           <p:cNvPicPr>
             <a:picLocks noChangeAspect="1"/>
           </p:cNvPicPr>
@@ -3580,8 +3580,8 @@
         </p:blipFill>
         <p:spPr>
           <a:xfrm>
-            <a:off x="2073705" y="132282"/>
-            <a:ext cx="4597625" cy="2425451"/>
+            <a:off x="-37289" y="105489"/>
+            <a:ext cx="1992462" cy="2465918"/>
           </a:xfrm>
           <a:prstGeom prst="rect">
             <a:avLst/>
@@ -3989,7 +3989,7 @@
         <p:spPr>
           <a:xfrm>
             <a:off x="2891371" y="936218"/>
-            <a:ext cx="478362" cy="0"/>
+            <a:ext cx="148162" cy="0"/>
           </a:xfrm>
           <a:prstGeom prst="straightConnector1">
             <a:avLst/>
@@ -4086,8 +4086,8 @@
         </p:nvCxnSpPr>
         <p:spPr>
           <a:xfrm flipH="1">
-            <a:off x="4128753" y="947260"/>
-            <a:ext cx="505600" cy="0"/>
+            <a:off x="4017395" y="947260"/>
+            <a:ext cx="616958" cy="0"/>
           </a:xfrm>
           <a:prstGeom prst="straightConnector1">
             <a:avLst/>
@@ -4124,7 +4124,7 @@
         </p:nvSpPr>
         <p:spPr>
           <a:xfrm>
-            <a:off x="4388509" y="993082"/>
+            <a:off x="4388509" y="1247032"/>
             <a:ext cx="1553968" cy="369332"/>
           </a:xfrm>
           <a:prstGeom prst="rect">
@@ -4156,8 +4156,8 @@
         </p:nvCxnSpPr>
         <p:spPr>
           <a:xfrm flipH="1" flipV="1">
-            <a:off x="4048891" y="1122865"/>
-            <a:ext cx="339618" cy="54883"/>
+            <a:off x="3756389" y="1423673"/>
+            <a:ext cx="632120" cy="8025"/>
           </a:xfrm>
           <a:prstGeom prst="straightConnector1">
             <a:avLst/>
@@ -4230,8 +4230,8 @@
         </p:nvCxnSpPr>
         <p:spPr>
           <a:xfrm flipV="1">
-            <a:off x="3039533" y="592667"/>
-            <a:ext cx="639876" cy="831006"/>
+            <a:off x="3039533" y="1106585"/>
+            <a:ext cx="240303" cy="317088"/>
           </a:xfrm>
           <a:prstGeom prst="straightConnector1">
             <a:avLst/>
@@ -4268,7 +4268,7 @@
         </p:nvSpPr>
         <p:spPr>
           <a:xfrm>
-            <a:off x="2557923" y="128964"/>
+            <a:off x="2557923" y="167449"/>
             <a:ext cx="1198466" cy="646331"/>
           </a:xfrm>
           <a:prstGeom prst="rect">
@@ -4337,13 +4337,15 @@
       <p:cxnSp>
         <p:nvCxnSpPr>
           <p:cNvPr id="88" name="Straight Arrow Connector 87"/>
-          <p:cNvCxnSpPr/>
+          <p:cNvCxnSpPr>
+            <a:stCxn id="91" idx="1"/>
+          </p:cNvCxnSpPr>
           <p:nvPr/>
         </p:nvCxnSpPr>
         <p:spPr>
           <a:xfrm flipH="1" flipV="1">
-            <a:off x="3995008" y="1616364"/>
-            <a:ext cx="254017" cy="230910"/>
+            <a:off x="3624891" y="1771066"/>
+            <a:ext cx="232478" cy="323166"/>
           </a:xfrm>
           <a:prstGeom prst="straightConnector1">
             <a:avLst/>
@@ -4380,7 +4382,7 @@
         </p:nvSpPr>
         <p:spPr>
           <a:xfrm>
-            <a:off x="4249025" y="1752916"/>
+            <a:off x="3857369" y="1771066"/>
             <a:ext cx="1553968" cy="646331"/>
           </a:xfrm>
           <a:prstGeom prst="rect">

</xml_diff>

<commit_message>
Size of the figures modified to reduce paper size.
</commit_message>
<xml_diff>
--- a/papers/Case2016/pictures/pdf/CoverPhoto.pptx
+++ b/papers/Case2016/pictures/pdf/CoverPhoto.pptx
@@ -3109,10 +3109,10 @@
           <p:nvPr/>
         </p:nvPicPr>
         <p:blipFill>
-          <a:blip r:embed="rId2">
+          <a:blip r:embed="rId2" cstate="email">
             <a:extLst>
               <a:ext uri="{28A0092B-C50C-407E-A947-70E740481C1C}">
-                <a14:useLocalDpi xmlns:a14="http://schemas.microsoft.com/office/drawing/2010/main" val="0"/>
+                <a14:useLocalDpi xmlns:a14="http://schemas.microsoft.com/office/drawing/2010/main"/>
               </a:ext>
             </a:extLst>
           </a:blip>
@@ -3139,7 +3139,7 @@
           <p:nvPr/>
         </p:nvPicPr>
         <p:blipFill>
-          <a:blip r:embed="rId3" cstate="screen">
+          <a:blip r:embed="rId3" cstate="email">
             <a:extLst>
               <a:ext uri="{28A0092B-C50C-407E-A947-70E740481C1C}">
                 <a14:useLocalDpi xmlns:a14="http://schemas.microsoft.com/office/drawing/2010/main"/>
@@ -3354,7 +3354,7 @@
           <p:nvPr/>
         </p:nvPicPr>
         <p:blipFill>
-          <a:blip r:embed="rId4" cstate="screen">
+          <a:blip r:embed="rId4" cstate="email">
             <a:extLst>
               <a:ext uri="{28A0092B-C50C-407E-A947-70E740481C1C}">
                 <a14:useLocalDpi xmlns:a14="http://schemas.microsoft.com/office/drawing/2010/main"/>
@@ -3567,7 +3567,7 @@
           <p:nvPr/>
         </p:nvPicPr>
         <p:blipFill>
-          <a:blip r:embed="rId5" cstate="screen">
+          <a:blip r:embed="rId5" cstate="email">
             <a:extLst>
               <a:ext uri="{28A0092B-C50C-407E-A947-70E740481C1C}">
                 <a14:useLocalDpi xmlns:a14="http://schemas.microsoft.com/office/drawing/2010/main"/>

</xml_diff>